<commit_message>
Präsentation Git für Windows + Beschreibung dazu im Readme
</commit_message>
<xml_diff>
--- a/Versionskontrolle.pptx
+++ b/Versionskontrolle.pptx
@@ -9791,7 +9791,12 @@
             <p:ph idx="1"/>
           </p:nvPr>
         </p:nvSpPr>
-        <p:spPr/>
+        <p:spPr>
+          <a:xfrm>
+            <a:off x="838200" y="1520825"/>
+            <a:ext cx="4512733" cy="4645025"/>
+          </a:xfrm>
+        </p:spPr>
         <p:txBody>
           <a:bodyPr/>
           <a:lstStyle/>

</xml_diff>